<commit_message>
Fri 10 Jun 7:00 PM Last Commit
</commit_message>
<xml_diff>
--- a/Presentation/project_yellowpanda.pptx
+++ b/Presentation/project_yellowpanda.pptx
@@ -5,10 +5,10 @@
     <p:sldMasterId id="2147483648" r:id="rId2"/>
   </p:sldMasterIdLst>
   <p:notesMasterIdLst>
-    <p:notesMasterId r:id="rId35"/>
+    <p:notesMasterId r:id="rId34"/>
   </p:notesMasterIdLst>
   <p:handoutMasterIdLst>
-    <p:handoutMasterId r:id="rId36"/>
+    <p:handoutMasterId r:id="rId35"/>
   </p:handoutMasterIdLst>
   <p:sldIdLst>
     <p:sldId id="259" r:id="rId3"/>
@@ -32,17 +32,16 @@
     <p:sldId id="299" r:id="rId21"/>
     <p:sldId id="328" r:id="rId22"/>
     <p:sldId id="291" r:id="rId23"/>
-    <p:sldId id="292" r:id="rId24"/>
-    <p:sldId id="281" r:id="rId25"/>
-    <p:sldId id="306" r:id="rId26"/>
-    <p:sldId id="307" r:id="rId27"/>
-    <p:sldId id="308" r:id="rId28"/>
-    <p:sldId id="309" r:id="rId29"/>
-    <p:sldId id="285" r:id="rId30"/>
-    <p:sldId id="290" r:id="rId31"/>
-    <p:sldId id="323" r:id="rId32"/>
-    <p:sldId id="313" r:id="rId33"/>
-    <p:sldId id="266" r:id="rId34"/>
+    <p:sldId id="281" r:id="rId24"/>
+    <p:sldId id="306" r:id="rId25"/>
+    <p:sldId id="307" r:id="rId26"/>
+    <p:sldId id="308" r:id="rId27"/>
+    <p:sldId id="309" r:id="rId28"/>
+    <p:sldId id="285" r:id="rId29"/>
+    <p:sldId id="290" r:id="rId30"/>
+    <p:sldId id="323" r:id="rId31"/>
+    <p:sldId id="313" r:id="rId32"/>
+    <p:sldId id="266" r:id="rId33"/>
   </p:sldIdLst>
   <p:sldSz cx="12192000" cy="6858000"/>
   <p:notesSz cx="6858000" cy="9144000"/>
@@ -3305,7 +3304,7 @@
           <a:p>
             <a:fld id="{0CC970DB-8EE6-4E5B-9CBE-4CA39D1A6EC2}" type="datetimeFigureOut">
               <a:rPr lang="en-US" smtClean="0"/>
-              <a:t>5/17/16</a:t>
+              <a:t>6/10/16</a:t>
             </a:fld>
             <a:endParaRPr lang="en-US" dirty="0"/>
           </a:p>
@@ -3470,7 +3469,7 @@
           <a:p>
             <a:fld id="{710A2C30-CB24-4D43-9508-20D3935E5F91}" type="datetimeFigureOut">
               <a:rPr lang="en-IN" smtClean="0"/>
-              <a:t>17/05/16</a:t>
+              <a:t>10/06/16</a:t>
             </a:fld>
             <a:endParaRPr lang="en-IN"/>
           </a:p>
@@ -4147,7 +4146,7 @@
           <a:p>
             <a:fld id="{C2DD0D6D-2C44-41A9-A07A-EB0F48F5A464}" type="slidenum">
               <a:rPr lang="en-IN" smtClean="0"/>
-              <a:t>28</a:t>
+              <a:t>27</a:t>
             </a:fld>
             <a:endParaRPr lang="en-IN"/>
           </a:p>
@@ -4231,7 +4230,7 @@
           <a:p>
             <a:fld id="{C2DD0D6D-2C44-41A9-A07A-EB0F48F5A464}" type="slidenum">
               <a:rPr lang="en-IN" smtClean="0"/>
-              <a:t>31</a:t>
+              <a:t>30</a:t>
             </a:fld>
             <a:endParaRPr lang="en-IN"/>
           </a:p>
@@ -4968,7 +4967,7 @@
           <a:p>
             <a:fld id="{90FFEE5F-65BB-4268-AC17-D19CED90FB82}" type="datetimeFigureOut">
               <a:rPr lang="en-US" smtClean="0"/>
-              <a:t>5/17/16</a:t>
+              <a:t>6/10/16</a:t>
             </a:fld>
             <a:endParaRPr lang="en-US" dirty="0"/>
           </a:p>
@@ -7139,7 +7138,7 @@
           <a:p>
             <a:fld id="{90FFEE5F-65BB-4268-AC17-D19CED90FB82}" type="datetimeFigureOut">
               <a:rPr lang="en-US" smtClean="0"/>
-              <a:t>5/17/16</a:t>
+              <a:t>6/10/16</a:t>
             </a:fld>
             <a:endParaRPr lang="en-US" dirty="0"/>
           </a:p>
@@ -7829,7 +7828,7 @@
           <a:p>
             <a:fld id="{90FFEE5F-65BB-4268-AC17-D19CED90FB82}" type="datetimeFigureOut">
               <a:rPr lang="en-US" smtClean="0"/>
-              <a:t>5/17/16</a:t>
+              <a:t>6/10/16</a:t>
             </a:fld>
             <a:endParaRPr lang="en-US" dirty="0"/>
           </a:p>
@@ -8553,7 +8552,7 @@
           <a:p>
             <a:fld id="{90FFEE5F-65BB-4268-AC17-D19CED90FB82}" type="datetimeFigureOut">
               <a:rPr lang="en-US" smtClean="0"/>
-              <a:t>5/17/16</a:t>
+              <a:t>6/10/16</a:t>
             </a:fld>
             <a:endParaRPr lang="en-US" dirty="0"/>
           </a:p>
@@ -8740,7 +8739,7 @@
           <a:p>
             <a:fld id="{90FFEE5F-65BB-4268-AC17-D19CED90FB82}" type="datetimeFigureOut">
               <a:rPr lang="en-US" smtClean="0"/>
-              <a:t>5/17/16</a:t>
+              <a:t>6/10/16</a:t>
             </a:fld>
             <a:endParaRPr lang="en-US" dirty="0"/>
           </a:p>
@@ -8917,7 +8916,7 @@
           <a:p>
             <a:fld id="{90FFEE5F-65BB-4268-AC17-D19CED90FB82}" type="datetimeFigureOut">
               <a:rPr lang="en-US" smtClean="0"/>
-              <a:t>5/17/16</a:t>
+              <a:t>6/10/16</a:t>
             </a:fld>
             <a:endParaRPr lang="en-US" dirty="0"/>
           </a:p>
@@ -9115,7 +9114,7 @@
           <a:p>
             <a:fld id="{90FFEE5F-65BB-4268-AC17-D19CED90FB82}" type="datetimeFigureOut">
               <a:rPr lang="en-US" smtClean="0"/>
-              <a:t>5/17/16</a:t>
+              <a:t>6/10/16</a:t>
             </a:fld>
             <a:endParaRPr lang="en-US" dirty="0"/>
           </a:p>
@@ -10117,7 +10116,7 @@
             <a:fld id="{90FFEE5F-65BB-4268-AC17-D19CED90FB82}" type="datetimeFigureOut">
               <a:rPr lang="en-US" smtClean="0"/>
               <a:pPr/>
-              <a:t>5/17/16</a:t>
+              <a:t>6/10/16</a:t>
             </a:fld>
             <a:endParaRPr lang="en-US" dirty="0"/>
           </a:p>
@@ -10423,7 +10422,7 @@
           <a:p>
             <a:fld id="{90FFEE5F-65BB-4268-AC17-D19CED90FB82}" type="datetimeFigureOut">
               <a:rPr lang="en-US" smtClean="0"/>
-              <a:t>5/17/16</a:t>
+              <a:t>6/10/16</a:t>
             </a:fld>
             <a:endParaRPr lang="en-US" dirty="0"/>
           </a:p>
@@ -10805,7 +10804,7 @@
           <a:p>
             <a:fld id="{90FFEE5F-65BB-4268-AC17-D19CED90FB82}" type="datetimeFigureOut">
               <a:rPr lang="en-US" smtClean="0"/>
-              <a:t>5/17/16</a:t>
+              <a:t>6/10/16</a:t>
             </a:fld>
             <a:endParaRPr lang="en-US" dirty="0"/>
           </a:p>
@@ -10930,7 +10929,7 @@
           <a:p>
             <a:fld id="{90FFEE5F-65BB-4268-AC17-D19CED90FB82}" type="datetimeFigureOut">
               <a:rPr lang="en-US" smtClean="0"/>
-              <a:t>5/17/16</a:t>
+              <a:t>6/10/16</a:t>
             </a:fld>
             <a:endParaRPr lang="en-US" dirty="0"/>
           </a:p>
@@ -11032,7 +11031,7 @@
           <a:p>
             <a:fld id="{90FFEE5F-65BB-4268-AC17-D19CED90FB82}" type="datetimeFigureOut">
               <a:rPr lang="en-US" smtClean="0"/>
-              <a:t>5/17/16</a:t>
+              <a:t>6/10/16</a:t>
             </a:fld>
             <a:endParaRPr lang="en-US" dirty="0"/>
           </a:p>
@@ -12952,7 +12951,7 @@
           <a:p>
             <a:fld id="{90FFEE5F-65BB-4268-AC17-D19CED90FB82}" type="datetimeFigureOut">
               <a:rPr lang="en-US" smtClean="0"/>
-              <a:t>5/17/16</a:t>
+              <a:t>6/10/16</a:t>
             </a:fld>
             <a:endParaRPr lang="en-US" dirty="0"/>
           </a:p>
@@ -14102,7 +14101,7 @@
             <a:fld id="{90FFEE5F-65BB-4268-AC17-D19CED90FB82}" type="datetimeFigureOut">
               <a:rPr lang="en-US" smtClean="0"/>
               <a:pPr/>
-              <a:t>5/17/16</a:t>
+              <a:t>6/10/16</a:t>
             </a:fld>
             <a:endParaRPr lang="en-US" dirty="0"/>
           </a:p>
@@ -28201,327 +28200,6 @@
 </file>
 
 <file path=ppt/slides/slide22.xml><?xml version="1.0" encoding="utf-8"?>
-<p:sld xmlns:a="http://schemas.openxmlformats.org/drawingml/2006/main" xmlns:r="http://schemas.openxmlformats.org/officeDocument/2006/relationships" xmlns:p="http://schemas.openxmlformats.org/presentationml/2006/main">
-  <p:cSld>
-    <p:spTree>
-      <p:nvGrpSpPr>
-        <p:cNvPr id="1" name=""/>
-        <p:cNvGrpSpPr/>
-        <p:nvPr/>
-      </p:nvGrpSpPr>
-      <p:grpSpPr>
-        <a:xfrm>
-          <a:off x="0" y="0"/>
-          <a:ext cx="0" cy="0"/>
-          <a:chOff x="0" y="0"/>
-          <a:chExt cx="0" cy="0"/>
-        </a:xfrm>
-      </p:grpSpPr>
-      <p:sp>
-        <p:nvSpPr>
-          <p:cNvPr id="2" name="Title 1"/>
-          <p:cNvSpPr>
-            <a:spLocks noGrp="1"/>
-          </p:cNvSpPr>
-          <p:nvPr>
-            <p:ph type="title"/>
-          </p:nvPr>
-        </p:nvSpPr>
-        <p:spPr/>
-        <p:txBody>
-          <a:bodyPr/>
-          <a:lstStyle/>
-          <a:p>
-            <a:r>
-              <a:rPr lang="en-US" dirty="0" smtClean="0"/>
-              <a:t>Implementation(contd..)</a:t>
-            </a:r>
-            <a:endParaRPr lang="en-US" dirty="0"/>
-          </a:p>
-        </p:txBody>
-      </p:sp>
-      <p:sp>
-        <p:nvSpPr>
-          <p:cNvPr id="3" name="Content Placeholder 2"/>
-          <p:cNvSpPr>
-            <a:spLocks noGrp="1"/>
-          </p:cNvSpPr>
-          <p:nvPr>
-            <p:ph idx="1"/>
-          </p:nvPr>
-        </p:nvSpPr>
-        <p:spPr>
-          <a:xfrm>
-            <a:off x="838200" y="1825625"/>
-            <a:ext cx="10297438" cy="3848665"/>
-          </a:xfrm>
-        </p:spPr>
-        <p:txBody>
-          <a:bodyPr>
-            <a:noAutofit/>
-          </a:bodyPr>
-          <a:lstStyle/>
-          <a:p>
-            <a:pPr marL="342900" indent="-342900">
-              <a:lnSpc>
-                <a:spcPct val="110000"/>
-              </a:lnSpc>
-              <a:buFont typeface="Wingdings" panose="05000000000000000000" pitchFamily="2" charset="2"/>
-              <a:buChar char="q"/>
-            </a:pPr>
-            <a:r>
-              <a:rPr lang="en-US" sz="1800" b="0" dirty="0"/>
-              <a:t>Detection of eyes and its </a:t>
-            </a:r>
-            <a:r>
-              <a:rPr lang="en-US" sz="1800" b="0" dirty="0" smtClean="0"/>
-              <a:t>condition</a:t>
-            </a:r>
-          </a:p>
-          <a:p>
-            <a:pPr marL="342900" indent="-342900" algn="just">
-              <a:lnSpc>
-                <a:spcPct val="110000"/>
-              </a:lnSpc>
-              <a:buFont typeface="Wingdings" panose="05000000000000000000" pitchFamily="2" charset="2"/>
-              <a:buChar char="Ø"/>
-            </a:pPr>
-            <a:r>
-              <a:rPr lang="en-US" sz="1800" b="0" dirty="0"/>
-              <a:t>Important factor which helps detect driver fatigue is the state of eyes, i.e. whether they are open or closed. We are locating the position of the eye in the frame taken from the drivers </a:t>
-            </a:r>
-            <a:r>
-              <a:rPr lang="en-US" sz="1800" b="0" dirty="0" smtClean="0"/>
-              <a:t>face. </a:t>
-            </a:r>
-            <a:r>
-              <a:rPr lang="en-US" sz="1800" b="0" dirty="0"/>
-              <a:t>In the state of fatigue, eyelid muscles subconsciously attempt to accelerate the process of going to </a:t>
-            </a:r>
-            <a:r>
-              <a:rPr lang="en-US" sz="1800" b="0" dirty="0" smtClean="0"/>
-              <a:t>sleep.</a:t>
-            </a:r>
-          </a:p>
-          <a:p>
-            <a:pPr marL="342900" indent="-342900" algn="just">
-              <a:lnSpc>
-                <a:spcPct val="110000"/>
-              </a:lnSpc>
-              <a:buFont typeface="Wingdings" panose="05000000000000000000" pitchFamily="2" charset="2"/>
-              <a:buChar char="Ø"/>
-            </a:pPr>
-            <a:endParaRPr lang="en-US" sz="1800" b="0" dirty="0" smtClean="0"/>
-          </a:p>
-          <a:p>
-            <a:pPr marL="342900" indent="-342900" algn="just">
-              <a:lnSpc>
-                <a:spcPct val="110000"/>
-              </a:lnSpc>
-              <a:buFont typeface="Wingdings" panose="05000000000000000000" pitchFamily="2" charset="2"/>
-              <a:buChar char="Ø"/>
-            </a:pPr>
-            <a:r>
-              <a:rPr lang="en-US" sz="1800" b="0" dirty="0" smtClean="0"/>
-              <a:t>Using </a:t>
-            </a:r>
-            <a:r>
-              <a:rPr lang="en-US" sz="1800" b="0" dirty="0"/>
-              <a:t>this property, determining whether eyes are open or closed is done by relying on the difference of brightness intensity of the pupil in the </a:t>
-            </a:r>
-            <a:r>
-              <a:rPr lang="en-US" sz="1800" b="0" dirty="0" smtClean="0"/>
-              <a:t>image. Here, in </a:t>
-            </a:r>
-            <a:r>
-              <a:rPr lang="en-US" sz="1800" b="0" dirty="0"/>
-              <a:t>this part</a:t>
-            </a:r>
-          </a:p>
-          <a:p>
-            <a:pPr marL="507683" lvl="1" algn="just">
-              <a:lnSpc>
-                <a:spcPct val="110000"/>
-              </a:lnSpc>
-            </a:pPr>
-            <a:r>
-              <a:rPr lang="en-US" sz="1800" b="0" dirty="0">
-                <a:solidFill>
-                  <a:schemeClr val="tx1">
-                    <a:lumMod val="75000"/>
-                    <a:lumOff val="25000"/>
-                  </a:schemeClr>
-                </a:solidFill>
-              </a:rPr>
-              <a:t>1</a:t>
-            </a:r>
-            <a:r>
-              <a:rPr lang="en-US" sz="1800" b="0" dirty="0" smtClean="0">
-                <a:solidFill>
-                  <a:schemeClr val="tx1">
-                    <a:lumMod val="75000"/>
-                    <a:lumOff val="25000"/>
-                  </a:schemeClr>
-                </a:solidFill>
-              </a:rPr>
-              <a:t>. Eyes </a:t>
-            </a:r>
-            <a:r>
-              <a:rPr lang="en-US" sz="1800" b="0" dirty="0">
-                <a:solidFill>
-                  <a:schemeClr val="tx1">
-                    <a:lumMod val="75000"/>
-                    <a:lumOff val="25000"/>
-                  </a:schemeClr>
-                </a:solidFill>
-              </a:rPr>
-              <a:t>are detected.</a:t>
-            </a:r>
-          </a:p>
-          <a:p>
-            <a:pPr marL="507683" lvl="1" algn="just">
-              <a:lnSpc>
-                <a:spcPct val="110000"/>
-              </a:lnSpc>
-            </a:pPr>
-            <a:r>
-              <a:rPr lang="en-US" sz="1800" b="0" dirty="0">
-                <a:solidFill>
-                  <a:schemeClr val="tx1">
-                    <a:lumMod val="75000"/>
-                    <a:lumOff val="25000"/>
-                  </a:schemeClr>
-                </a:solidFill>
-              </a:rPr>
-              <a:t>2</a:t>
-            </a:r>
-            <a:r>
-              <a:rPr lang="en-US" sz="1800" b="0" dirty="0" smtClean="0">
-                <a:solidFill>
-                  <a:schemeClr val="tx1">
-                    <a:lumMod val="75000"/>
-                    <a:lumOff val="25000"/>
-                  </a:schemeClr>
-                </a:solidFill>
-              </a:rPr>
-              <a:t>. Eyes </a:t>
-            </a:r>
-            <a:r>
-              <a:rPr lang="en-US" sz="1800" b="0" dirty="0">
-                <a:solidFill>
-                  <a:schemeClr val="tx1">
-                    <a:lumMod val="75000"/>
-                    <a:lumOff val="25000"/>
-                  </a:schemeClr>
-                </a:solidFill>
-              </a:rPr>
-              <a:t>are segmented from the </a:t>
-            </a:r>
-            <a:r>
-              <a:rPr lang="en-US" sz="1800" b="0" dirty="0" smtClean="0">
-                <a:solidFill>
-                  <a:schemeClr val="tx1">
-                    <a:lumMod val="75000"/>
-                    <a:lumOff val="25000"/>
-                  </a:schemeClr>
-                </a:solidFill>
-              </a:rPr>
-              <a:t>face</a:t>
-            </a:r>
-          </a:p>
-          <a:p>
-            <a:pPr marL="507683" lvl="1" algn="just">
-              <a:lnSpc>
-                <a:spcPct val="110000"/>
-              </a:lnSpc>
-            </a:pPr>
-            <a:r>
-              <a:rPr lang="en-US" sz="1800" b="0" dirty="0" smtClean="0">
-                <a:solidFill>
-                  <a:schemeClr val="tx1">
-                    <a:lumMod val="75000"/>
-                    <a:lumOff val="25000"/>
-                  </a:schemeClr>
-                </a:solidFill>
-              </a:rPr>
-              <a:t>3. Edge detection is done to detect the edges of the eyes</a:t>
-            </a:r>
-            <a:endParaRPr lang="en-US" sz="1800" b="0" dirty="0">
-              <a:solidFill>
-                <a:schemeClr val="tx1">
-                  <a:lumMod val="75000"/>
-                  <a:lumOff val="25000"/>
-                </a:schemeClr>
-              </a:solidFill>
-            </a:endParaRPr>
-          </a:p>
-          <a:p>
-            <a:pPr lvl="1" algn="just">
-              <a:lnSpc>
-                <a:spcPct val="110000"/>
-              </a:lnSpc>
-            </a:pPr>
-            <a:r>
-              <a:rPr lang="en-US" sz="1800" dirty="0">
-                <a:solidFill>
-                  <a:schemeClr val="tx1">
-                    <a:lumMod val="75000"/>
-                    <a:lumOff val="25000"/>
-                  </a:schemeClr>
-                </a:solidFill>
-              </a:rPr>
-              <a:t/>
-            </a:r>
-            <a:br>
-              <a:rPr lang="en-US" sz="1800" dirty="0">
-                <a:solidFill>
-                  <a:schemeClr val="tx1">
-                    <a:lumMod val="75000"/>
-                    <a:lumOff val="25000"/>
-                  </a:schemeClr>
-                </a:solidFill>
-              </a:rPr>
-            </a:br>
-            <a:endParaRPr lang="en-US" sz="1800" dirty="0">
-              <a:solidFill>
-                <a:schemeClr val="tx1">
-                  <a:lumMod val="75000"/>
-                  <a:lumOff val="25000"/>
-                </a:schemeClr>
-              </a:solidFill>
-            </a:endParaRPr>
-          </a:p>
-        </p:txBody>
-      </p:sp>
-    </p:spTree>
-    <p:extLst>
-      <p:ext uri="{BB962C8B-B14F-4D97-AF65-F5344CB8AC3E}">
-        <p14:creationId xmlns:p14="http://schemas.microsoft.com/office/powerpoint/2010/main" val="3298851144"/>
-      </p:ext>
-    </p:extLst>
-  </p:cSld>
-  <p:clrMapOvr>
-    <a:masterClrMapping/>
-  </p:clrMapOvr>
-  <mc:AlternateContent xmlns:mc="http://schemas.openxmlformats.org/markup-compatibility/2006" xmlns:p14="http://schemas.microsoft.com/office/powerpoint/2010/main">
-    <mc:Choice Requires="p14">
-      <p:transition p14:dur="0"/>
-    </mc:Choice>
-    <mc:Fallback xmlns="">
-      <p:transition/>
-    </mc:Fallback>
-  </mc:AlternateContent>
-  <p:timing>
-    <p:tnLst>
-      <p:par>
-        <p:cTn id="1" dur="indefinite" restart="never" nodeType="tmRoot"/>
-      </p:par>
-    </p:tnLst>
-  </p:timing>
-</p:sld>
-</file>
-
-<file path=ppt/slides/slide23.xml><?xml version="1.0" encoding="utf-8"?>
 <p:sld xmlns:a="http://schemas.openxmlformats.org/drawingml/2006/main" xmlns:r="http://schemas.openxmlformats.org/officeDocument/2006/relationships" xmlns:p="http://schemas.openxmlformats.org/presentationml/2006/main">
   <p:cSld>
     <p:spTree>
@@ -30482,6 +30160,93 @@
 </p:sld>
 </file>
 
+<file path=ppt/slides/slide23.xml><?xml version="1.0" encoding="utf-8"?>
+<p:sld xmlns:a="http://schemas.openxmlformats.org/drawingml/2006/main" xmlns:r="http://schemas.openxmlformats.org/officeDocument/2006/relationships" xmlns:p="http://schemas.openxmlformats.org/presentationml/2006/main">
+  <p:cSld>
+    <p:spTree>
+      <p:nvGrpSpPr>
+        <p:cNvPr id="1" name=""/>
+        <p:cNvGrpSpPr/>
+        <p:nvPr/>
+      </p:nvGrpSpPr>
+      <p:grpSpPr>
+        <a:xfrm>
+          <a:off x="0" y="0"/>
+          <a:ext cx="0" cy="0"/>
+          <a:chOff x="0" y="0"/>
+          <a:chExt cx="0" cy="0"/>
+        </a:xfrm>
+      </p:grpSpPr>
+      <p:sp>
+        <p:nvSpPr>
+          <p:cNvPr id="2" name="Title 1"/>
+          <p:cNvSpPr>
+            <a:spLocks noGrp="1"/>
+          </p:cNvSpPr>
+          <p:nvPr>
+            <p:ph type="title"/>
+          </p:nvPr>
+        </p:nvSpPr>
+        <p:spPr/>
+        <p:txBody>
+          <a:bodyPr/>
+          <a:lstStyle/>
+          <a:p>
+            <a:r>
+              <a:rPr lang="en-US" dirty="0" smtClean="0"/>
+              <a:t>Snapshots</a:t>
+            </a:r>
+            <a:endParaRPr lang="en-US" dirty="0"/>
+          </a:p>
+        </p:txBody>
+      </p:sp>
+      <p:sp>
+        <p:nvSpPr>
+          <p:cNvPr id="3" name="Content Placeholder 2"/>
+          <p:cNvSpPr>
+            <a:spLocks noGrp="1"/>
+          </p:cNvSpPr>
+          <p:nvPr>
+            <p:ph idx="1"/>
+          </p:nvPr>
+        </p:nvSpPr>
+        <p:spPr/>
+        <p:txBody>
+          <a:bodyPr/>
+          <a:lstStyle/>
+          <a:p>
+            <a:endParaRPr lang="en-US"/>
+          </a:p>
+        </p:txBody>
+      </p:sp>
+    </p:spTree>
+    <p:extLst>
+      <p:ext uri="{BB962C8B-B14F-4D97-AF65-F5344CB8AC3E}">
+        <p14:creationId xmlns:p14="http://schemas.microsoft.com/office/powerpoint/2010/main" val="3828478301"/>
+      </p:ext>
+    </p:extLst>
+  </p:cSld>
+  <p:clrMapOvr>
+    <a:masterClrMapping/>
+  </p:clrMapOvr>
+  <mc:AlternateContent xmlns:mc="http://schemas.openxmlformats.org/markup-compatibility/2006" xmlns:p14="http://schemas.microsoft.com/office/powerpoint/2010/main">
+    <mc:Choice Requires="p14">
+      <p:transition p14:dur="0"/>
+    </mc:Choice>
+    <mc:Fallback xmlns="">
+      <p:transition/>
+    </mc:Fallback>
+  </mc:AlternateContent>
+  <p:timing>
+    <p:tnLst>
+      <p:par>
+        <p:cTn id="1" dur="indefinite" restart="never" nodeType="tmRoot"/>
+      </p:par>
+    </p:tnLst>
+  </p:timing>
+</p:sld>
+</file>
+
 <file path=ppt/slides/slide24.xml><?xml version="1.0" encoding="utf-8"?>
 <p:sld xmlns:a="http://schemas.openxmlformats.org/drawingml/2006/main" xmlns:r="http://schemas.openxmlformats.org/officeDocument/2006/relationships" xmlns:p="http://schemas.openxmlformats.org/presentationml/2006/main">
   <p:cSld>
@@ -30524,7 +30289,7 @@
       </p:sp>
       <p:sp>
         <p:nvSpPr>
-          <p:cNvPr id="3" name="Content Placeholder 2"/>
+          <p:cNvPr id="6" name="Content Placeholder 5"/>
           <p:cNvSpPr>
             <a:spLocks noGrp="1"/>
           </p:cNvSpPr>
@@ -30544,7 +30309,7 @@
     </p:spTree>
     <p:extLst>
       <p:ext uri="{BB962C8B-B14F-4D97-AF65-F5344CB8AC3E}">
-        <p14:creationId xmlns:p14="http://schemas.microsoft.com/office/powerpoint/2010/main" val="3828478301"/>
+        <p14:creationId xmlns:p14="http://schemas.microsoft.com/office/powerpoint/2010/main" val="3654357949"/>
       </p:ext>
     </p:extLst>
   </p:cSld>
@@ -30631,7 +30396,7 @@
     </p:spTree>
     <p:extLst>
       <p:ext uri="{BB962C8B-B14F-4D97-AF65-F5344CB8AC3E}">
-        <p14:creationId xmlns:p14="http://schemas.microsoft.com/office/powerpoint/2010/main" val="3654357949"/>
+        <p14:creationId xmlns:p14="http://schemas.microsoft.com/office/powerpoint/2010/main" val="3991973246"/>
       </p:ext>
     </p:extLst>
   </p:cSld>
@@ -30718,7 +30483,7 @@
     </p:spTree>
     <p:extLst>
       <p:ext uri="{BB962C8B-B14F-4D97-AF65-F5344CB8AC3E}">
-        <p14:creationId xmlns:p14="http://schemas.microsoft.com/office/powerpoint/2010/main" val="3991973246"/>
+        <p14:creationId xmlns:p14="http://schemas.microsoft.com/office/powerpoint/2010/main" val="2501889576"/>
       </p:ext>
     </p:extLst>
   </p:cSld>
@@ -30777,7 +30542,7 @@
           <a:p>
             <a:r>
               <a:rPr lang="en-US" dirty="0" smtClean="0"/>
-              <a:t>Snapshots</a:t>
+              <a:t>Applications</a:t>
             </a:r>
             <a:endParaRPr lang="en-US" dirty="0"/>
           </a:p>
@@ -30785,7 +30550,7 @@
       </p:sp>
       <p:sp>
         <p:nvSpPr>
-          <p:cNvPr id="6" name="Content Placeholder 5"/>
+          <p:cNvPr id="3" name="Content Placeholder 2"/>
           <p:cNvSpPr>
             <a:spLocks noGrp="1"/>
           </p:cNvSpPr>
@@ -30798,14 +30563,40 @@
           <a:bodyPr/>
           <a:lstStyle/>
           <a:p>
-            <a:endParaRPr lang="en-US"/>
+            <a:pPr marL="342900" indent="-342900" algn="just">
+              <a:buFont typeface="Wingdings" panose="05000000000000000000" pitchFamily="2" charset="2"/>
+              <a:buChar char="q"/>
+            </a:pPr>
+            <a:r>
+              <a:rPr lang="en-US" b="0" dirty="0" smtClean="0"/>
+              <a:t>Can be used in integration with personal assistants like Google Now or SIRI</a:t>
+            </a:r>
+            <a:r>
+              <a:rPr lang="en-US" b="0" dirty="0"/>
+              <a:t> </a:t>
+            </a:r>
+            <a:r>
+              <a:rPr lang="en-US" b="0" dirty="0" smtClean="0"/>
+              <a:t>to solve general purpose questions involving trivial mathematics. </a:t>
+            </a:r>
+          </a:p>
+          <a:p>
+            <a:pPr marL="342900" indent="-342900" algn="just">
+              <a:buFont typeface="Wingdings" panose="05000000000000000000" pitchFamily="2" charset="2"/>
+              <a:buChar char="q"/>
+            </a:pPr>
+            <a:r>
+              <a:rPr lang="en-US" b="0" dirty="0" smtClean="0"/>
+              <a:t>Machine Learning and  NLU module can be hooked up to Twitter or Facebook stream to get immediate features and correlation associativity between 2 topics</a:t>
+            </a:r>
+            <a:endParaRPr lang="en-US" b="0" dirty="0"/>
           </a:p>
         </p:txBody>
       </p:sp>
     </p:spTree>
     <p:extLst>
       <p:ext uri="{BB962C8B-B14F-4D97-AF65-F5344CB8AC3E}">
-        <p14:creationId xmlns:p14="http://schemas.microsoft.com/office/powerpoint/2010/main" val="2501889576"/>
+        <p14:creationId xmlns:p14="http://schemas.microsoft.com/office/powerpoint/2010/main" val="1443719063"/>
       </p:ext>
     </p:extLst>
   </p:cSld>
@@ -30864,7 +30655,7 @@
           <a:p>
             <a:r>
               <a:rPr lang="en-US" dirty="0" smtClean="0"/>
-              <a:t>Applications</a:t>
+              <a:t>Conclusion </a:t>
             </a:r>
             <a:endParaRPr lang="en-US" dirty="0"/>
           </a:p>
@@ -30880,45 +30671,143 @@
             <p:ph idx="1"/>
           </p:nvPr>
         </p:nvSpPr>
-        <p:spPr/>
+        <p:spPr>
+          <a:xfrm>
+            <a:off x="838200" y="1437318"/>
+            <a:ext cx="10515600" cy="4351338"/>
+          </a:xfrm>
+        </p:spPr>
         <p:txBody>
-          <a:bodyPr/>
+          <a:bodyPr>
+            <a:noAutofit/>
+          </a:bodyPr>
           <a:lstStyle/>
           <a:p>
+            <a:pPr algn="just"/>
+            <a:endParaRPr lang="en-US" sz="1800" b="0" dirty="0" smtClean="0"/>
+          </a:p>
+          <a:p>
             <a:pPr marL="342900" indent="-342900" algn="just">
+              <a:lnSpc>
+                <a:spcPct val="120000"/>
+              </a:lnSpc>
               <a:buFont typeface="Wingdings" panose="05000000000000000000" pitchFamily="2" charset="2"/>
               <a:buChar char="q"/>
             </a:pPr>
             <a:r>
-              <a:rPr lang="en-US" b="0" dirty="0" smtClean="0"/>
-              <a:t>Can be used in integration with personal assistants like Google Now or SIRI</a:t>
-            </a:r>
-            <a:r>
-              <a:rPr lang="en-US" b="0" dirty="0"/>
-              <a:t> </a:t>
-            </a:r>
-            <a:r>
-              <a:rPr lang="en-US" b="0" dirty="0" smtClean="0"/>
-              <a:t>to solve general purpose questions involving trivial mathematics. </a:t>
+              <a:rPr lang="en-US" sz="1800" b="0" dirty="0"/>
+              <a:t>A  </a:t>
+            </a:r>
+            <a:r>
+              <a:rPr lang="en-US" sz="1800" b="0" dirty="0" smtClean="0"/>
+              <a:t>auto scraping tool for html pages was developed to save time in data collection.</a:t>
             </a:r>
           </a:p>
           <a:p>
             <a:pPr marL="342900" indent="-342900" algn="just">
+              <a:lnSpc>
+                <a:spcPct val="120000"/>
+              </a:lnSpc>
               <a:buFont typeface="Wingdings" panose="05000000000000000000" pitchFamily="2" charset="2"/>
               <a:buChar char="q"/>
             </a:pPr>
             <a:r>
-              <a:rPr lang="en-US" b="0" dirty="0" smtClean="0"/>
-              <a:t>Machine Learning and  NLU module can be hooked up to Twitter or Facebook stream to get immediate features and correlation associativity between 2 topics</a:t>
-            </a:r>
-            <a:endParaRPr lang="en-US" b="0" dirty="0"/>
+              <a:rPr lang="en-US" sz="1800" b="0" dirty="0" smtClean="0"/>
+              <a:t>Concepts of NumPy arrays and vector tables where used to convert language to roughly equivalent mathematical format for the machine to derive on conclusion.</a:t>
+            </a:r>
+          </a:p>
+          <a:p>
+            <a:pPr marL="342900" indent="-342900" algn="just">
+              <a:lnSpc>
+                <a:spcPct val="120000"/>
+              </a:lnSpc>
+              <a:buFont typeface="Wingdings" panose="05000000000000000000" pitchFamily="2" charset="2"/>
+              <a:buChar char="q"/>
+            </a:pPr>
+            <a:r>
+              <a:rPr lang="en-US" sz="1800" b="0" dirty="0" smtClean="0"/>
+              <a:t>Data cleaning techniques where used to find and remove or replace anomalies in data.</a:t>
+            </a:r>
+          </a:p>
+          <a:p>
+            <a:pPr marL="342900" indent="-342900" algn="just">
+              <a:lnSpc>
+                <a:spcPct val="120000"/>
+              </a:lnSpc>
+              <a:buFont typeface="Wingdings" panose="05000000000000000000" pitchFamily="2" charset="2"/>
+              <a:buChar char="q"/>
+            </a:pPr>
+            <a:r>
+              <a:rPr lang="en-US" sz="1800" b="0" dirty="0" smtClean="0"/>
+              <a:t>Natural Language module harnessed the features of the data to make correlation with domain specific mathematical model.</a:t>
+            </a:r>
+          </a:p>
+          <a:p>
+            <a:pPr marL="342900" indent="-342900" algn="just">
+              <a:lnSpc>
+                <a:spcPct val="120000"/>
+              </a:lnSpc>
+              <a:buFont typeface="Wingdings" panose="05000000000000000000" pitchFamily="2" charset="2"/>
+              <a:buChar char="q"/>
+            </a:pPr>
+            <a:r>
+              <a:rPr lang="en-US" sz="1800" b="0" dirty="0" smtClean="0"/>
+              <a:t>The </a:t>
+            </a:r>
+            <a:r>
+              <a:rPr lang="en-US" sz="1800" b="0" dirty="0"/>
+              <a:t>following conclusions were made</a:t>
+            </a:r>
+            <a:r>
+              <a:rPr lang="en-US" sz="1800" b="0" dirty="0" smtClean="0"/>
+              <a:t>:</a:t>
+            </a:r>
+          </a:p>
+          <a:p>
+            <a:pPr marL="576263" lvl="1" indent="-342900" algn="just">
+              <a:lnSpc>
+                <a:spcPct val="120000"/>
+              </a:lnSpc>
+              <a:buFont typeface="+mj-lt"/>
+              <a:buAutoNum type="arabicPeriod"/>
+            </a:pPr>
+            <a:r>
+              <a:rPr lang="en-US" sz="1800" dirty="0" smtClean="0">
+                <a:solidFill>
+                  <a:schemeClr val="tx1"/>
+                </a:solidFill>
+              </a:rPr>
+              <a:t>A strong and pretty accurate model of feature vector was developed for a high accuracy score.</a:t>
+            </a:r>
+          </a:p>
+          <a:p>
+            <a:pPr marL="576263" lvl="1" indent="-342900" algn="just">
+              <a:lnSpc>
+                <a:spcPct val="120000"/>
+              </a:lnSpc>
+              <a:buFont typeface="+mj-lt"/>
+              <a:buAutoNum type="arabicPeriod"/>
+            </a:pPr>
+            <a:r>
+              <a:rPr lang="en-US" sz="1800" b="0" dirty="0" smtClean="0">
+                <a:solidFill>
+                  <a:schemeClr val="tx1"/>
+                </a:solidFill>
+              </a:rPr>
+              <a:t>The Natural language model requires a huge corpus and strong integration with machine learning</a:t>
+            </a:r>
+            <a:endParaRPr lang="en-US" sz="1800" b="0" dirty="0">
+              <a:solidFill>
+                <a:schemeClr val="tx1"/>
+              </a:solidFill>
+            </a:endParaRPr>
           </a:p>
         </p:txBody>
       </p:sp>
     </p:spTree>
     <p:extLst>
       <p:ext uri="{BB962C8B-B14F-4D97-AF65-F5344CB8AC3E}">
-        <p14:creationId xmlns:p14="http://schemas.microsoft.com/office/powerpoint/2010/main" val="1443719063"/>
+        <p14:creationId xmlns:p14="http://schemas.microsoft.com/office/powerpoint/2010/main" val="3885107875"/>
       </p:ext>
     </p:extLst>
   </p:cSld>
@@ -30976,10 +30865,10 @@
           <a:lstStyle/>
           <a:p>
             <a:r>
-              <a:rPr lang="en-US" dirty="0" smtClean="0"/>
-              <a:t>Conclusion </a:t>
-            </a:r>
-            <a:endParaRPr lang="en-US" dirty="0"/>
+              <a:rPr lang="en-GB" dirty="0" smtClean="0"/>
+              <a:t>Limitations</a:t>
+            </a:r>
+            <a:endParaRPr lang="en-GB" dirty="0"/>
           </a:p>
         </p:txBody>
       </p:sp>
@@ -30993,143 +30882,53 @@
             <p:ph idx="1"/>
           </p:nvPr>
         </p:nvSpPr>
-        <p:spPr>
-          <a:xfrm>
-            <a:off x="838200" y="1437318"/>
-            <a:ext cx="10515600" cy="4351338"/>
-          </a:xfrm>
-        </p:spPr>
+        <p:spPr/>
         <p:txBody>
-          <a:bodyPr>
-            <a:noAutofit/>
-          </a:bodyPr>
+          <a:bodyPr/>
           <a:lstStyle/>
           <a:p>
-            <a:pPr algn="just"/>
-            <a:endParaRPr lang="en-US" sz="1800" b="0" dirty="0" smtClean="0"/>
-          </a:p>
-          <a:p>
             <a:pPr marL="342900" indent="-342900" algn="just">
-              <a:lnSpc>
-                <a:spcPct val="120000"/>
-              </a:lnSpc>
               <a:buFont typeface="Wingdings" panose="05000000000000000000" pitchFamily="2" charset="2"/>
               <a:buChar char="q"/>
             </a:pPr>
             <a:r>
-              <a:rPr lang="en-US" sz="1800" b="0" dirty="0"/>
-              <a:t>A  </a:t>
-            </a:r>
-            <a:r>
-              <a:rPr lang="en-US" sz="1800" b="0" dirty="0" smtClean="0"/>
-              <a:t>auto scraping tool for html pages was developed to save time in data collection.</a:t>
+              <a:rPr lang="en-GB" b="0" dirty="0" smtClean="0"/>
+              <a:t>The model generated by iterative machine learning gives an accuracy of 85–90% only.</a:t>
             </a:r>
           </a:p>
           <a:p>
             <a:pPr marL="342900" indent="-342900" algn="just">
-              <a:lnSpc>
-                <a:spcPct val="120000"/>
-              </a:lnSpc>
               <a:buFont typeface="Wingdings" panose="05000000000000000000" pitchFamily="2" charset="2"/>
               <a:buChar char="q"/>
             </a:pPr>
             <a:r>
-              <a:rPr lang="en-US" sz="1800" b="0" dirty="0" smtClean="0"/>
-              <a:t>Concepts of NumPy arrays and vector tables where used to convert language to roughly equivalent mathematical format for the machine to derive on conclusion.</a:t>
+              <a:rPr lang="en-GB" b="0" dirty="0" smtClean="0"/>
+              <a:t>Data cleaning techniques have to a long way before highly incorrect grammars can be detected and most importantly rectified. </a:t>
             </a:r>
           </a:p>
           <a:p>
             <a:pPr marL="342900" indent="-342900" algn="just">
-              <a:lnSpc>
-                <a:spcPct val="120000"/>
-              </a:lnSpc>
               <a:buFont typeface="Wingdings" panose="05000000000000000000" pitchFamily="2" charset="2"/>
               <a:buChar char="q"/>
             </a:pPr>
             <a:r>
-              <a:rPr lang="en-US" sz="1800" b="0" dirty="0" smtClean="0"/>
-              <a:t>Data cleaning techniques where used to find and remove or replace anomalies in data.</a:t>
+              <a:rPr lang="en-GB" b="0" dirty="0" smtClean="0"/>
+              <a:t>Mapping of objects from NLU  to a generalised mathematical model is challenging.</a:t>
             </a:r>
           </a:p>
           <a:p>
             <a:pPr marL="342900" indent="-342900" algn="just">
-              <a:lnSpc>
-                <a:spcPct val="120000"/>
-              </a:lnSpc>
               <a:buFont typeface="Wingdings" panose="05000000000000000000" pitchFamily="2" charset="2"/>
               <a:buChar char="q"/>
             </a:pPr>
-            <a:r>
-              <a:rPr lang="en-US" sz="1800" b="0" dirty="0" smtClean="0"/>
-              <a:t>Natural Language module harnessed the features of the data to make correlation with domain specific mathematical model.</a:t>
-            </a:r>
-          </a:p>
-          <a:p>
-            <a:pPr marL="342900" indent="-342900" algn="just">
-              <a:lnSpc>
-                <a:spcPct val="120000"/>
-              </a:lnSpc>
-              <a:buFont typeface="Wingdings" panose="05000000000000000000" pitchFamily="2" charset="2"/>
-              <a:buChar char="q"/>
-            </a:pPr>
-            <a:r>
-              <a:rPr lang="en-US" sz="1800" b="0" dirty="0" smtClean="0"/>
-              <a:t>The </a:t>
-            </a:r>
-            <a:r>
-              <a:rPr lang="en-US" sz="1800" b="0" dirty="0"/>
-              <a:t>following conclusions were made</a:t>
-            </a:r>
-            <a:r>
-              <a:rPr lang="en-US" sz="1800" b="0" dirty="0" smtClean="0"/>
-              <a:t>:</a:t>
-            </a:r>
-          </a:p>
-          <a:p>
-            <a:pPr marL="576263" lvl="1" indent="-342900" algn="just">
-              <a:lnSpc>
-                <a:spcPct val="120000"/>
-              </a:lnSpc>
-              <a:buFont typeface="+mj-lt"/>
-              <a:buAutoNum type="arabicPeriod"/>
-            </a:pPr>
-            <a:r>
-              <a:rPr lang="en-US" sz="1800" dirty="0" smtClean="0">
-                <a:solidFill>
-                  <a:schemeClr val="tx1"/>
-                </a:solidFill>
-              </a:rPr>
-              <a:t>A strong and pretty accurate model of feature vector was developed for a high accuracy score.</a:t>
-            </a:r>
-          </a:p>
-          <a:p>
-            <a:pPr marL="576263" lvl="1" indent="-342900" algn="just">
-              <a:lnSpc>
-                <a:spcPct val="120000"/>
-              </a:lnSpc>
-              <a:buFont typeface="+mj-lt"/>
-              <a:buAutoNum type="arabicPeriod"/>
-            </a:pPr>
-            <a:r>
-              <a:rPr lang="en-US" sz="1800" b="0" dirty="0" smtClean="0">
-                <a:solidFill>
-                  <a:schemeClr val="tx1"/>
-                </a:solidFill>
-              </a:rPr>
-              <a:t>The Natural language model requires a huge corpus and strong integration with machine learning</a:t>
-            </a:r>
-            <a:endParaRPr lang="en-US" sz="1800" b="0" dirty="0">
-              <a:solidFill>
-                <a:schemeClr val="tx1"/>
-              </a:solidFill>
-            </a:endParaRPr>
+            <a:endParaRPr lang="en-GB" b="0" dirty="0"/>
           </a:p>
         </p:txBody>
       </p:sp>
     </p:spTree>
     <p:extLst>
       <p:ext uri="{BB962C8B-B14F-4D97-AF65-F5344CB8AC3E}">
-        <p14:creationId xmlns:p14="http://schemas.microsoft.com/office/powerpoint/2010/main" val="3885107875"/>
+        <p14:creationId xmlns:p14="http://schemas.microsoft.com/office/powerpoint/2010/main" val="1638341203"/>
       </p:ext>
     </p:extLst>
   </p:cSld>
@@ -31449,127 +31248,6 @@
           <a:p>
             <a:r>
               <a:rPr lang="en-GB" dirty="0" smtClean="0"/>
-              <a:t>Limitations</a:t>
-            </a:r>
-            <a:endParaRPr lang="en-GB" dirty="0"/>
-          </a:p>
-        </p:txBody>
-      </p:sp>
-      <p:sp>
-        <p:nvSpPr>
-          <p:cNvPr id="3" name="Content Placeholder 2"/>
-          <p:cNvSpPr>
-            <a:spLocks noGrp="1"/>
-          </p:cNvSpPr>
-          <p:nvPr>
-            <p:ph idx="1"/>
-          </p:nvPr>
-        </p:nvSpPr>
-        <p:spPr/>
-        <p:txBody>
-          <a:bodyPr/>
-          <a:lstStyle/>
-          <a:p>
-            <a:pPr marL="342900" indent="-342900" algn="just">
-              <a:buFont typeface="Wingdings" panose="05000000000000000000" pitchFamily="2" charset="2"/>
-              <a:buChar char="q"/>
-            </a:pPr>
-            <a:r>
-              <a:rPr lang="en-GB" b="0" dirty="0" smtClean="0"/>
-              <a:t>The model generated by iterative machine learning gives an accuracy of 85–90% only.</a:t>
-            </a:r>
-          </a:p>
-          <a:p>
-            <a:pPr marL="342900" indent="-342900" algn="just">
-              <a:buFont typeface="Wingdings" panose="05000000000000000000" pitchFamily="2" charset="2"/>
-              <a:buChar char="q"/>
-            </a:pPr>
-            <a:r>
-              <a:rPr lang="en-GB" b="0" dirty="0" smtClean="0"/>
-              <a:t>Data cleaning techniques have to a long way before highly incorrect grammars can be detected and most importantly rectified. </a:t>
-            </a:r>
-          </a:p>
-          <a:p>
-            <a:pPr marL="342900" indent="-342900" algn="just">
-              <a:buFont typeface="Wingdings" panose="05000000000000000000" pitchFamily="2" charset="2"/>
-              <a:buChar char="q"/>
-            </a:pPr>
-            <a:r>
-              <a:rPr lang="en-GB" b="0" dirty="0" smtClean="0"/>
-              <a:t>Mapping of objects from NLU  to a generalised mathematical model is challenging.</a:t>
-            </a:r>
-          </a:p>
-          <a:p>
-            <a:pPr marL="342900" indent="-342900" algn="just">
-              <a:buFont typeface="Wingdings" panose="05000000000000000000" pitchFamily="2" charset="2"/>
-              <a:buChar char="q"/>
-            </a:pPr>
-            <a:endParaRPr lang="en-GB" b="0" dirty="0"/>
-          </a:p>
-        </p:txBody>
-      </p:sp>
-    </p:spTree>
-    <p:extLst>
-      <p:ext uri="{BB962C8B-B14F-4D97-AF65-F5344CB8AC3E}">
-        <p14:creationId xmlns:p14="http://schemas.microsoft.com/office/powerpoint/2010/main" val="1638341203"/>
-      </p:ext>
-    </p:extLst>
-  </p:cSld>
-  <p:clrMapOvr>
-    <a:masterClrMapping/>
-  </p:clrMapOvr>
-  <mc:AlternateContent xmlns:mc="http://schemas.openxmlformats.org/markup-compatibility/2006" xmlns:p14="http://schemas.microsoft.com/office/powerpoint/2010/main">
-    <mc:Choice Requires="p14">
-      <p:transition p14:dur="0"/>
-    </mc:Choice>
-    <mc:Fallback xmlns="">
-      <p:transition/>
-    </mc:Fallback>
-  </mc:AlternateContent>
-  <p:timing>
-    <p:tnLst>
-      <p:par>
-        <p:cTn id="1" dur="indefinite" restart="never" nodeType="tmRoot"/>
-      </p:par>
-    </p:tnLst>
-  </p:timing>
-</p:sld>
-</file>
-
-<file path=ppt/slides/slide31.xml><?xml version="1.0" encoding="utf-8"?>
-<p:sld xmlns:a="http://schemas.openxmlformats.org/drawingml/2006/main" xmlns:r="http://schemas.openxmlformats.org/officeDocument/2006/relationships" xmlns:p="http://schemas.openxmlformats.org/presentationml/2006/main">
-  <p:cSld>
-    <p:spTree>
-      <p:nvGrpSpPr>
-        <p:cNvPr id="1" name=""/>
-        <p:cNvGrpSpPr/>
-        <p:nvPr/>
-      </p:nvGrpSpPr>
-      <p:grpSpPr>
-        <a:xfrm>
-          <a:off x="0" y="0"/>
-          <a:ext cx="0" cy="0"/>
-          <a:chOff x="0" y="0"/>
-          <a:chExt cx="0" cy="0"/>
-        </a:xfrm>
-      </p:grpSpPr>
-      <p:sp>
-        <p:nvSpPr>
-          <p:cNvPr id="2" name="Title 1"/>
-          <p:cNvSpPr>
-            <a:spLocks noGrp="1"/>
-          </p:cNvSpPr>
-          <p:nvPr>
-            <p:ph type="title"/>
-          </p:nvPr>
-        </p:nvSpPr>
-        <p:spPr/>
-        <p:txBody>
-          <a:bodyPr/>
-          <a:lstStyle/>
-          <a:p>
-            <a:r>
-              <a:rPr lang="en-GB" dirty="0" smtClean="0"/>
               <a:t>Future Enhancements</a:t>
             </a:r>
             <a:endParaRPr lang="en-GB" dirty="0"/>
@@ -31654,7 +31332,7 @@
 </p:sld>
 </file>
 
-<file path=ppt/slides/slide32.xml><?xml version="1.0" encoding="utf-8"?>
+<file path=ppt/slides/slide31.xml><?xml version="1.0" encoding="utf-8"?>
 <p:sld xmlns:a="http://schemas.openxmlformats.org/drawingml/2006/main" xmlns:r="http://schemas.openxmlformats.org/officeDocument/2006/relationships" xmlns:p="http://schemas.openxmlformats.org/presentationml/2006/main">
   <p:cSld>
     <p:spTree>

</xml_diff>